<commit_message>
updated the whitepaper presentation
</commit_message>
<xml_diff>
--- a/Kiran/WhitePaper_Blockchain_presentation_Kiran.pptx
+++ b/Kiran/WhitePaper_Blockchain_presentation_Kiran.pptx
@@ -134,6 +134,7 @@
 <p1510:revInfo xmlns:a="http://schemas.openxmlformats.org/drawingml/2006/main" xmlns:r="http://schemas.openxmlformats.org/officeDocument/2006/relationships" xmlns:p1510="http://schemas.microsoft.com/office/powerpoint/2015/10/main">
   <p1510:revLst>
     <p1510:client id="{61AE349F-E7A5-4315-A0A5-682B163907CD}" v="14" dt="2022-04-19T16:03:19.940"/>
+    <p1510:client id="{D41673E2-005B-4781-94DF-75AA83C11B7D}" v="6" dt="2022-04-19T16:36:45.077"/>
   </p1510:revLst>
 </p1510:revInfo>
 </file>
@@ -143,18 +144,18 @@
   <pc:docChgLst>
     <pc:chgData name="Chandana Ch" userId="a5ce7f05659b57db" providerId="LiveId" clId="{D41673E2-005B-4781-94DF-75AA83C11B7D}"/>
     <pc:docChg chg="modSld">
-      <pc:chgData name="Chandana Ch" userId="a5ce7f05659b57db" providerId="LiveId" clId="{D41673E2-005B-4781-94DF-75AA83C11B7D}" dt="2022-04-19T16:08:33.877" v="0"/>
+      <pc:chgData name="Chandana Ch" userId="a5ce7f05659b57db" providerId="LiveId" clId="{D41673E2-005B-4781-94DF-75AA83C11B7D}" dt="2022-04-19T16:35:54.493" v="3"/>
       <pc:docMkLst>
         <pc:docMk/>
       </pc:docMkLst>
       <pc:sldChg chg="modSp mod">
-        <pc:chgData name="Chandana Ch" userId="a5ce7f05659b57db" providerId="LiveId" clId="{D41673E2-005B-4781-94DF-75AA83C11B7D}" dt="2022-04-19T16:08:33.877" v="0"/>
+        <pc:chgData name="Chandana Ch" userId="a5ce7f05659b57db" providerId="LiveId" clId="{D41673E2-005B-4781-94DF-75AA83C11B7D}" dt="2022-04-19T16:35:54.493" v="3"/>
         <pc:sldMkLst>
           <pc:docMk/>
           <pc:sldMk cId="1046414464" sldId="284"/>
         </pc:sldMkLst>
         <pc:spChg chg="mod">
-          <ac:chgData name="Chandana Ch" userId="a5ce7f05659b57db" providerId="LiveId" clId="{D41673E2-005B-4781-94DF-75AA83C11B7D}" dt="2022-04-19T16:08:33.877" v="0"/>
+          <ac:chgData name="Chandana Ch" userId="a5ce7f05659b57db" providerId="LiveId" clId="{D41673E2-005B-4781-94DF-75AA83C11B7D}" dt="2022-04-19T16:35:54.493" v="3"/>
           <ac:spMkLst>
             <pc:docMk/>
             <pc:sldMk cId="1046414464" sldId="284"/>
@@ -6308,25 +6309,7 @@
                 </a:solidFill>
                 <a:cs typeface="Times New Roman" panose="02020603050405020304" pitchFamily="18" charset="0"/>
               </a:rPr>
-              <a:t>Several </a:t>
-            </a:r>
-            <a:r>
-              <a:rPr lang="en-US" sz="2400" dirty="0" err="1">
-                <a:solidFill>
-                  <a:schemeClr val="tx1"/>
-                </a:solidFill>
-                <a:cs typeface="Times New Roman" panose="02020603050405020304" pitchFamily="18" charset="0"/>
-              </a:rPr>
-              <a:t>DApps</a:t>
-            </a:r>
-            <a:r>
-              <a:rPr lang="en-US" sz="2400" dirty="0">
-                <a:solidFill>
-                  <a:schemeClr val="tx1"/>
-                </a:solidFill>
-                <a:cs typeface="Times New Roman" panose="02020603050405020304" pitchFamily="18" charset="0"/>
-              </a:rPr>
-              <a:t> in the market in Proof of Work or Proof of Stake</a:t>
+              <a:t>Several DApps in the market in Proof of Work or Proof of Stake</a:t>
             </a:r>
           </a:p>
           <a:p>
@@ -6347,23 +6330,8 @@
                 </a:solidFill>
                 <a:cs typeface="Times New Roman" panose="02020603050405020304" pitchFamily="18" charset="0"/>
               </a:rPr>
-              <a:t>Understood the importance of anonymity, governance, security while building </a:t>
-            </a:r>
-            <a:r>
-              <a:rPr lang="en-US" sz="2400" dirty="0" err="1">
-                <a:solidFill>
-                  <a:schemeClr val="tx1"/>
-                </a:solidFill>
-                <a:cs typeface="Times New Roman" panose="02020603050405020304" pitchFamily="18" charset="0"/>
-              </a:rPr>
-              <a:t>DApps</a:t>
-            </a:r>
-            <a:endParaRPr lang="en-US" sz="2400" dirty="0">
-              <a:solidFill>
-                <a:schemeClr val="tx1"/>
-              </a:solidFill>
-              <a:cs typeface="Times New Roman" panose="02020603050405020304" pitchFamily="18" charset="0"/>
-            </a:endParaRPr>
+              <a:t>Understood the importance of anonymity, governance, security while building DApps</a:t>
+            </a:r>
           </a:p>
           <a:p>
             <a:pPr marL="342900" indent="-342900" algn="l">
@@ -6807,12 +6775,85 @@
               </a:rPr>
               <a:t>ICS-690/WhitePaper_Blockchain_Kiran.pdf at main · go2kiran/ICS-690 (github.com)</a:t>
             </a:r>
+            <a:endParaRPr lang="en-US" sz="2000" dirty="0"/>
+          </a:p>
+          <a:p>
+            <a:pPr marL="342900" indent="-342900" algn="l">
+              <a:lnSpc>
+                <a:spcPct val="150000"/>
+              </a:lnSpc>
+              <a:spcBef>
+                <a:spcPts val="600"/>
+              </a:spcBef>
+              <a:buFont typeface="Wingdings" panose="05000000000000000000" pitchFamily="2" charset="2"/>
+              <a:buChar char="q"/>
+            </a:pPr>
+            <a:endParaRPr lang="en-US" sz="2000" dirty="0">
+              <a:solidFill>
+                <a:schemeClr val="tx1"/>
+              </a:solidFill>
+              <a:cs typeface="Times New Roman" panose="02020603050405020304" pitchFamily="18" charset="0"/>
+            </a:endParaRPr>
+          </a:p>
+          <a:p>
+            <a:pPr marL="342900" indent="-342900" algn="l">
+              <a:lnSpc>
+                <a:spcPct val="150000"/>
+              </a:lnSpc>
+              <a:spcBef>
+                <a:spcPts val="600"/>
+              </a:spcBef>
+              <a:buFont typeface="Wingdings" panose="05000000000000000000" pitchFamily="2" charset="2"/>
+              <a:buChar char="q"/>
+            </a:pPr>
+            <a:r>
+              <a:rPr lang="en-US" sz="2400" dirty="0">
+                <a:solidFill>
+                  <a:schemeClr val="tx1"/>
+                </a:solidFill>
+                <a:cs typeface="Times New Roman" panose="02020603050405020304" pitchFamily="18" charset="0"/>
+              </a:rPr>
+              <a:t>“Everything will be tokenized and connected by a blockchain one day.” – Fred Ehrsam</a:t>
+            </a:r>
+          </a:p>
+          <a:p>
+            <a:pPr marL="342900" indent="-342900" algn="l">
+              <a:lnSpc>
+                <a:spcPct val="150000"/>
+              </a:lnSpc>
+              <a:spcBef>
+                <a:spcPts val="600"/>
+              </a:spcBef>
+              <a:buFont typeface="Wingdings" panose="05000000000000000000" pitchFamily="2" charset="2"/>
+              <a:buChar char="q"/>
+            </a:pPr>
             <a:endParaRPr lang="en-US" sz="2400" dirty="0">
               <a:solidFill>
                 <a:schemeClr val="tx1"/>
               </a:solidFill>
               <a:cs typeface="Times New Roman" panose="02020603050405020304" pitchFamily="18" charset="0"/>
             </a:endParaRPr>
+          </a:p>
+          <a:p>
+            <a:pPr marL="342900" indent="-342900" algn="l">
+              <a:lnSpc>
+                <a:spcPct val="150000"/>
+              </a:lnSpc>
+              <a:spcBef>
+                <a:spcPts val="600"/>
+              </a:spcBef>
+              <a:buFont typeface="Wingdings" panose="05000000000000000000" pitchFamily="2" charset="2"/>
+              <a:buChar char="q"/>
+            </a:pPr>
+            <a:r>
+              <a:rPr lang="en-US" sz="2400" dirty="0">
+                <a:solidFill>
+                  <a:schemeClr val="tx1"/>
+                </a:solidFill>
+                <a:cs typeface="Times New Roman" panose="02020603050405020304" pitchFamily="18" charset="0"/>
+              </a:rPr>
+              <a:t>“The old question ‘Is it in the database?’ will be replaced by ‘Is it on the blockchain?’ “ – William Mougayar</a:t>
+            </a:r>
           </a:p>
         </p:txBody>
       </p:sp>
@@ -7085,79 +7126,7 @@
                 <a:ea typeface="Times New Roman" panose="02020603050405020304" pitchFamily="18" charset="0"/>
                 <a:hlinkClick r:id="rId4"/>
               </a:rPr>
-              <a:t>samarth30/</a:t>
-            </a:r>
-            <a:r>
-              <a:rPr lang="en-US" sz="1800" u="sng" dirty="0" err="1">
-                <a:solidFill>
-                  <a:srgbClr val="0563C1"/>
-                </a:solidFill>
-                <a:effectLst/>
-                <a:latin typeface="Times New Roman" panose="02020603050405020304" pitchFamily="18" charset="0"/>
-                <a:ea typeface="Times New Roman" panose="02020603050405020304" pitchFamily="18" charset="0"/>
-                <a:hlinkClick r:id="rId4"/>
-              </a:rPr>
-              <a:t>chitFund</a:t>
-            </a:r>
-            <a:r>
-              <a:rPr lang="en-US" sz="1800" u="sng" dirty="0">
-                <a:solidFill>
-                  <a:srgbClr val="0563C1"/>
-                </a:solidFill>
-                <a:effectLst/>
-                <a:latin typeface="Times New Roman" panose="02020603050405020304" pitchFamily="18" charset="0"/>
-                <a:ea typeface="Times New Roman" panose="02020603050405020304" pitchFamily="18" charset="0"/>
-                <a:hlinkClick r:id="rId4"/>
-              </a:rPr>
-              <a:t>: </a:t>
-            </a:r>
-            <a:r>
-              <a:rPr lang="en-US" sz="1800" u="sng" dirty="0" err="1">
-                <a:solidFill>
-                  <a:srgbClr val="0563C1"/>
-                </a:solidFill>
-                <a:effectLst/>
-                <a:latin typeface="Times New Roman" panose="02020603050405020304" pitchFamily="18" charset="0"/>
-                <a:ea typeface="Times New Roman" panose="02020603050405020304" pitchFamily="18" charset="0"/>
-                <a:hlinkClick r:id="rId4"/>
-              </a:rPr>
-              <a:t>chitFund</a:t>
-            </a:r>
-            <a:r>
-              <a:rPr lang="en-US" sz="1800" u="sng" dirty="0">
-                <a:solidFill>
-                  <a:srgbClr val="0563C1"/>
-                </a:solidFill>
-                <a:effectLst/>
-                <a:latin typeface="Times New Roman" panose="02020603050405020304" pitchFamily="18" charset="0"/>
-                <a:ea typeface="Times New Roman" panose="02020603050405020304" pitchFamily="18" charset="0"/>
-                <a:hlinkClick r:id="rId4"/>
-              </a:rPr>
-              <a:t> - built using smart contracts , web3 , </a:t>
-            </a:r>
-            <a:r>
-              <a:rPr lang="en-US" sz="1800" u="sng" dirty="0" err="1">
-                <a:solidFill>
-                  <a:srgbClr val="0563C1"/>
-                </a:solidFill>
-                <a:effectLst/>
-                <a:latin typeface="Times New Roman" panose="02020603050405020304" pitchFamily="18" charset="0"/>
-                <a:ea typeface="Times New Roman" panose="02020603050405020304" pitchFamily="18" charset="0"/>
-                <a:hlinkClick r:id="rId4"/>
-              </a:rPr>
-              <a:t>reactjs</a:t>
-            </a:r>
-            <a:r>
-              <a:rPr lang="en-US" sz="1800" u="sng" dirty="0">
-                <a:solidFill>
-                  <a:srgbClr val="0563C1"/>
-                </a:solidFill>
-                <a:effectLst/>
-                <a:latin typeface="Times New Roman" panose="02020603050405020304" pitchFamily="18" charset="0"/>
-                <a:ea typeface="Times New Roman" panose="02020603050405020304" pitchFamily="18" charset="0"/>
-                <a:hlinkClick r:id="rId4"/>
-              </a:rPr>
-              <a:t> (github.com)</a:t>
+              <a:t>samarth30/chitFund: chitFund - built using smart contracts , web3 , reactjs (github.com)</a:t>
             </a:r>
             <a:endParaRPr lang="en-US" sz="1800" dirty="0">
               <a:effectLst/>
@@ -7188,7 +7157,7 @@
               <a:t>[4] </a:t>
             </a:r>
             <a:r>
-              <a:rPr lang="en-US" sz="1800" u="sng" dirty="0" err="1">
+              <a:rPr lang="en-US" sz="1800" u="sng" dirty="0">
                 <a:solidFill>
                   <a:srgbClr val="0563C1"/>
                 </a:solidFill>
@@ -7197,67 +7166,7 @@
                 <a:ea typeface="Times New Roman" panose="02020603050405020304" pitchFamily="18" charset="0"/>
                 <a:hlinkClick r:id="rId5"/>
               </a:rPr>
-              <a:t>OpenZeppelin</a:t>
-            </a:r>
-            <a:r>
-              <a:rPr lang="en-US" sz="1800" u="sng" dirty="0">
-                <a:solidFill>
-                  <a:srgbClr val="0563C1"/>
-                </a:solidFill>
-                <a:effectLst/>
-                <a:latin typeface="Times New Roman" panose="02020603050405020304" pitchFamily="18" charset="0"/>
-                <a:ea typeface="Times New Roman" panose="02020603050405020304" pitchFamily="18" charset="0"/>
-                <a:hlinkClick r:id="rId5"/>
-              </a:rPr>
-              <a:t>/</a:t>
-            </a:r>
-            <a:r>
-              <a:rPr lang="en-US" sz="1800" u="sng" dirty="0" err="1">
-                <a:solidFill>
-                  <a:srgbClr val="0563C1"/>
-                </a:solidFill>
-                <a:effectLst/>
-                <a:latin typeface="Times New Roman" panose="02020603050405020304" pitchFamily="18" charset="0"/>
-                <a:ea typeface="Times New Roman" panose="02020603050405020304" pitchFamily="18" charset="0"/>
-                <a:hlinkClick r:id="rId5"/>
-              </a:rPr>
-              <a:t>openzeppelin</a:t>
-            </a:r>
-            <a:r>
-              <a:rPr lang="en-US" sz="1800" u="sng" dirty="0">
-                <a:solidFill>
-                  <a:srgbClr val="0563C1"/>
-                </a:solidFill>
-                <a:effectLst/>
-                <a:latin typeface="Times New Roman" panose="02020603050405020304" pitchFamily="18" charset="0"/>
-                <a:ea typeface="Times New Roman" panose="02020603050405020304" pitchFamily="18" charset="0"/>
-                <a:hlinkClick r:id="rId5"/>
-              </a:rPr>
-              <a:t>-contracts: </a:t>
-            </a:r>
-            <a:r>
-              <a:rPr lang="en-US" sz="1800" u="sng" dirty="0" err="1">
-                <a:solidFill>
-                  <a:srgbClr val="0563C1"/>
-                </a:solidFill>
-                <a:effectLst/>
-                <a:latin typeface="Times New Roman" panose="02020603050405020304" pitchFamily="18" charset="0"/>
-                <a:ea typeface="Times New Roman" panose="02020603050405020304" pitchFamily="18" charset="0"/>
-                <a:hlinkClick r:id="rId5"/>
-              </a:rPr>
-              <a:t>OpenZeppelin</a:t>
-            </a:r>
-            <a:r>
-              <a:rPr lang="en-US" sz="1800" u="sng" dirty="0">
-                <a:solidFill>
-                  <a:srgbClr val="0563C1"/>
-                </a:solidFill>
-                <a:effectLst/>
-                <a:latin typeface="Times New Roman" panose="02020603050405020304" pitchFamily="18" charset="0"/>
-                <a:ea typeface="Times New Roman" panose="02020603050405020304" pitchFamily="18" charset="0"/>
-                <a:hlinkClick r:id="rId5"/>
-              </a:rPr>
-              <a:t> Contracts is a library for secure smart contract development. (github.com)</a:t>
+              <a:t>OpenZeppelin/openzeppelin-contracts: OpenZeppelin Contracts is a library for secure smart contract development. (github.com)</a:t>
             </a:r>
             <a:endParaRPr lang="en-US" sz="1800" dirty="0">
               <a:effectLst/>

</xml_diff>